<commit_message>
More cleanup and documentation improvement
</commit_message>
<xml_diff>
--- a/data-raw/ICAMS-overview.pptx
+++ b/data-raw/ICAMS-overview.pptx
@@ -10613,15 +10613,7 @@
                   <a:schemeClr val="tx1"/>
                 </a:solidFill>
               </a:rPr>
-              <a:t>Una</a:t>
-            </a:r>
-            <a:r>
-              <a:rPr lang="en-US" sz="1100" dirty="0" smtClean="0">
-                <a:solidFill>
-                  <a:schemeClr val="tx1"/>
-                </a:solidFill>
-              </a:rPr>
-              <a:t>nnotated DNS </a:t>
+              <a:t>Unannotated DNS </a:t>
             </a:r>
             <a:r>
               <a:rPr lang="en-US" sz="1100" dirty="0" err="1" smtClean="0">
@@ -11644,23 +11636,7 @@
                   <a:schemeClr val="tx1"/>
                 </a:solidFill>
               </a:rPr>
-              <a:t>Una</a:t>
-            </a:r>
-            <a:r>
-              <a:rPr lang="en-US" sz="1100" dirty="0" smtClean="0">
-                <a:solidFill>
-                  <a:schemeClr val="tx1"/>
-                </a:solidFill>
-              </a:rPr>
-              <a:t>nnotated </a:t>
-            </a:r>
-            <a:r>
-              <a:rPr lang="en-US" sz="1100" dirty="0" smtClean="0">
-                <a:solidFill>
-                  <a:schemeClr val="tx1"/>
-                </a:solidFill>
-              </a:rPr>
-              <a:t>ID </a:t>
+              <a:t>Unannotated ID </a:t>
             </a:r>
             <a:r>
               <a:rPr lang="en-US" sz="1100" dirty="0" err="1" smtClean="0">
@@ -12027,15 +12003,7 @@
                   <a:schemeClr val="tx1"/>
                 </a:solidFill>
               </a:rPr>
-              <a:t> </a:t>
-            </a:r>
-            <a:r>
-              <a:rPr lang="en-US" sz="1100" kern="1200" dirty="0" smtClean="0">
-                <a:solidFill>
-                  <a:schemeClr val="tx1"/>
-                </a:solidFill>
-              </a:rPr>
-              <a:t>SBS VCF</a:t>
+              <a:t> SBS VCF</a:t>
             </a:r>
           </a:p>
         </p:txBody>
@@ -12326,15 +12294,7 @@
                   <a:schemeClr val="tx1"/>
                 </a:solidFill>
               </a:rPr>
-              <a:t>=Una</a:t>
-            </a:r>
-            <a:r>
-              <a:rPr lang="en-US" sz="1100" dirty="0" smtClean="0">
-                <a:solidFill>
-                  <a:schemeClr val="tx1"/>
-                </a:solidFill>
-              </a:rPr>
-              <a:t>nnotated DNS </a:t>
+              <a:t>=Unannotated DNS </a:t>
             </a:r>
             <a:r>
               <a:rPr lang="en-US" sz="1100" dirty="0" err="1" smtClean="0">
@@ -12508,15 +12468,7 @@
                   <a:schemeClr val="tx1"/>
                 </a:solidFill>
               </a:rPr>
-              <a:t> </a:t>
-            </a:r>
-            <a:r>
-              <a:rPr lang="en-US" sz="1100" kern="1200" dirty="0" smtClean="0">
-                <a:solidFill>
-                  <a:schemeClr val="tx1"/>
-                </a:solidFill>
-              </a:rPr>
-              <a:t>of </a:t>
+              <a:t> of </a:t>
             </a:r>
             <a:r>
               <a:rPr lang="en-US" sz="1100" kern="1200" dirty="0" err="1" smtClean="0">
@@ -12905,31 +12857,7 @@
                   <a:schemeClr val="tx1"/>
                 </a:solidFill>
               </a:rPr>
-              <a:t>Split SNS, DNS, </a:t>
-            </a:r>
-            <a:r>
-              <a:rPr lang="en-US" sz="1100" kern="1200" dirty="0" smtClean="0">
-                <a:solidFill>
-                  <a:schemeClr val="tx1"/>
-                </a:solidFill>
-              </a:rPr>
-              <a:t>TNS </a:t>
-            </a:r>
-            <a:r>
-              <a:rPr lang="en-US" sz="1100" kern="1200" dirty="0" smtClean="0">
-                <a:solidFill>
-                  <a:schemeClr val="tx1"/>
-                </a:solidFill>
-              </a:rPr>
-              <a:t>and </a:t>
-            </a:r>
-            <a:r>
-              <a:rPr lang="en-US" sz="1100" kern="1200" dirty="0" smtClean="0">
-                <a:solidFill>
-                  <a:schemeClr val="tx1"/>
-                </a:solidFill>
-              </a:rPr>
-              <a:t>longer, and </a:t>
+              <a:t>Split SNS, DNS, TNS and longer, and </a:t>
             </a:r>
             <a:r>
               <a:rPr lang="en-US" sz="1100" kern="1200" dirty="0" err="1" smtClean="0">
@@ -13179,23 +13107,7 @@
                   <a:schemeClr val="tx1"/>
                 </a:solidFill>
               </a:rPr>
-              <a:t> </a:t>
-            </a:r>
-            <a:r>
-              <a:rPr lang="en-US" sz="1100" kern="1200" dirty="0" smtClean="0">
-                <a:solidFill>
-                  <a:schemeClr val="tx1"/>
-                </a:solidFill>
-              </a:rPr>
-              <a:t>of </a:t>
-            </a:r>
-            <a:r>
-              <a:rPr lang="en-US" sz="1100" kern="1200" dirty="0" smtClean="0">
-                <a:solidFill>
-                  <a:schemeClr val="tx1"/>
-                </a:solidFill>
-              </a:rPr>
-              <a:t>multi-allelic variants</a:t>
+              <a:t> of multi-allelic variants</a:t>
             </a:r>
             <a:endParaRPr lang="en-US" sz="1100" kern="1200" dirty="0">
               <a:solidFill>
@@ -13357,23 +13269,7 @@
                   <a:schemeClr val="tx1"/>
                 </a:solidFill>
               </a:rPr>
-              <a:t>Una</a:t>
-            </a:r>
-            <a:r>
-              <a:rPr lang="en-US" sz="1100" dirty="0" smtClean="0">
-                <a:solidFill>
-                  <a:schemeClr val="tx1"/>
-                </a:solidFill>
-              </a:rPr>
-              <a:t>nnotated </a:t>
-            </a:r>
-            <a:r>
-              <a:rPr lang="en-US" sz="1100" dirty="0" smtClean="0">
-                <a:solidFill>
-                  <a:schemeClr val="tx1"/>
-                </a:solidFill>
-              </a:rPr>
-              <a:t>ID </a:t>
+              <a:t>Unannotated ID </a:t>
             </a:r>
             <a:r>
               <a:rPr lang="en-US" sz="1100" dirty="0" err="1" smtClean="0">
@@ -16237,15 +16133,7 @@
                   <a:schemeClr val="tx1"/>
                 </a:solidFill>
               </a:rPr>
-              <a:t>(no </a:t>
-            </a:r>
-            <a:r>
-              <a:rPr lang="en-US" sz="1100" kern="1200" dirty="0" smtClean="0">
-                <a:solidFill>
-                  <a:schemeClr val="tx1"/>
-                </a:solidFill>
-              </a:rPr>
-              <a:t>SNSs)</a:t>
+              <a:t>(no SNSs)</a:t>
             </a:r>
             <a:endParaRPr lang="en-US" sz="1100" kern="1200" dirty="0">
               <a:solidFill>
@@ -19308,15 +19196,7 @@
                   <a:schemeClr val="tx1"/>
                 </a:solidFill>
               </a:rPr>
-              <a:t>Annotated </a:t>
-            </a:r>
-            <a:r>
-              <a:rPr lang="en-US" sz="1100" dirty="0" smtClean="0">
-                <a:solidFill>
-                  <a:schemeClr val="tx1"/>
-                </a:solidFill>
-              </a:rPr>
-              <a:t>ID </a:t>
+              <a:t>Annotated ID </a:t>
             </a:r>
             <a:r>
               <a:rPr lang="en-US" sz="1100" dirty="0" err="1" smtClean="0">
@@ -19926,7 +19806,15 @@
                   <a:schemeClr val="tx1"/>
                 </a:solidFill>
               </a:rPr>
-              <a:t>Una</a:t>
+              <a:t>Unannotated DNS </a:t>
+            </a:r>
+            <a:r>
+              <a:rPr lang="en-US" sz="1100" dirty="0" err="1" smtClean="0">
+                <a:solidFill>
+                  <a:schemeClr val="tx1"/>
+                </a:solidFill>
+              </a:rPr>
+              <a:t>VCFs</a:t>
             </a:r>
             <a:r>
               <a:rPr lang="en-US" sz="1100" dirty="0" smtClean="0">
@@ -19934,22 +19822,6 @@
                   <a:schemeClr val="tx1"/>
                 </a:solidFill>
               </a:rPr>
-              <a:t>nnotated DNS </a:t>
-            </a:r>
-            <a:r>
-              <a:rPr lang="en-US" sz="1100" dirty="0" err="1" smtClean="0">
-                <a:solidFill>
-                  <a:schemeClr val="tx1"/>
-                </a:solidFill>
-              </a:rPr>
-              <a:t>VCFs</a:t>
-            </a:r>
-            <a:r>
-              <a:rPr lang="en-US" sz="1100" dirty="0" smtClean="0">
-                <a:solidFill>
-                  <a:schemeClr val="tx1"/>
-                </a:solidFill>
-              </a:rPr>
               <a:t> </a:t>
             </a:r>
             <a:r>
@@ -19958,15 +19830,7 @@
                   <a:schemeClr val="tx1"/>
                 </a:solidFill>
               </a:rPr>
-              <a:t>(</a:t>
-            </a:r>
-            <a:r>
-              <a:rPr lang="en-US" sz="1100" kern="1200" dirty="0" smtClean="0">
-                <a:solidFill>
-                  <a:schemeClr val="tx1"/>
-                </a:solidFill>
-              </a:rPr>
-              <a:t>no SNSs)</a:t>
+              <a:t>(no SNSs)</a:t>
             </a:r>
             <a:endParaRPr lang="en-US" sz="1100" kern="1200" dirty="0">
               <a:solidFill>
@@ -20090,23 +19954,7 @@
                   <a:schemeClr val="tx1"/>
                 </a:solidFill>
               </a:rPr>
-              <a:t>Una</a:t>
-            </a:r>
-            <a:r>
-              <a:rPr lang="en-US" sz="1100" dirty="0" smtClean="0">
-                <a:solidFill>
-                  <a:schemeClr val="tx1"/>
-                </a:solidFill>
-              </a:rPr>
-              <a:t>nnotated </a:t>
-            </a:r>
-            <a:r>
-              <a:rPr lang="en-US" sz="1100" dirty="0" smtClean="0">
-                <a:solidFill>
-                  <a:schemeClr val="tx1"/>
-                </a:solidFill>
-              </a:rPr>
-              <a:t>ID </a:t>
+              <a:t>Unannotated ID </a:t>
             </a:r>
             <a:r>
               <a:rPr lang="en-US" sz="1100" dirty="0" err="1" smtClean="0">
@@ -20297,7 +20145,7 @@
         </p:nvSpPr>
         <p:spPr>
           <a:xfrm>
-            <a:off x="477876" y="886830"/>
+            <a:off x="496256" y="781146"/>
             <a:ext cx="11441488" cy="923330"/>
           </a:xfrm>
           <a:prstGeom prst="rect">
@@ -20572,6 +20420,108 @@
           <a:p>
             <a:pPr algn="ctr"/>
             <a:endParaRPr lang="en-US"/>
+          </a:p>
+        </p:txBody>
+      </p:sp>
+      <p:sp>
+        <p:nvSpPr>
+          <p:cNvPr id="3" name="TextBox 2"/>
+          <p:cNvSpPr txBox="1"/>
+          <p:nvPr/>
+        </p:nvSpPr>
+        <p:spPr>
+          <a:xfrm>
+            <a:off x="5757504" y="1672570"/>
+            <a:ext cx="1508683" cy="276999"/>
+          </a:xfrm>
+          <a:prstGeom prst="rect">
+            <a:avLst/>
+          </a:prstGeom>
+          <a:noFill/>
+        </p:spPr>
+        <p:txBody>
+          <a:bodyPr wrap="none" rtlCol="0">
+            <a:spAutoFit/>
+          </a:bodyPr>
+          <a:lstStyle/>
+          <a:p>
+            <a:r>
+              <a:rPr lang="en-US" sz="1200" dirty="0" err="1" smtClean="0"/>
+              <a:t>VCFsToDNSCatalogs</a:t>
+            </a:r>
+            <a:r>
+              <a:rPr lang="en-US" sz="1200" dirty="0" smtClean="0"/>
+              <a:t>()</a:t>
+            </a:r>
+            <a:endParaRPr lang="en-US" sz="1200" dirty="0"/>
+          </a:p>
+        </p:txBody>
+      </p:sp>
+      <p:sp>
+        <p:nvSpPr>
+          <p:cNvPr id="84" name="TextBox 83"/>
+          <p:cNvSpPr txBox="1"/>
+          <p:nvPr/>
+        </p:nvSpPr>
+        <p:spPr>
+          <a:xfrm>
+            <a:off x="207541" y="1714690"/>
+            <a:ext cx="1484637" cy="276999"/>
+          </a:xfrm>
+          <a:prstGeom prst="rect">
+            <a:avLst/>
+          </a:prstGeom>
+          <a:noFill/>
+        </p:spPr>
+        <p:txBody>
+          <a:bodyPr wrap="none" rtlCol="0">
+            <a:spAutoFit/>
+          </a:bodyPr>
+          <a:lstStyle/>
+          <a:p>
+            <a:r>
+              <a:rPr lang="en-US" sz="1200" dirty="0" err="1" smtClean="0"/>
+              <a:t>VCFsToSNSCatalogs</a:t>
+            </a:r>
+            <a:r>
+              <a:rPr lang="en-US" sz="1200" dirty="0" smtClean="0"/>
+              <a:t>()</a:t>
+            </a:r>
+            <a:endParaRPr lang="en-US" sz="1200" dirty="0"/>
+          </a:p>
+        </p:txBody>
+      </p:sp>
+      <p:sp>
+        <p:nvSpPr>
+          <p:cNvPr id="85" name="TextBox 84"/>
+          <p:cNvSpPr txBox="1"/>
+          <p:nvPr/>
+        </p:nvSpPr>
+        <p:spPr>
+          <a:xfrm>
+            <a:off x="10142642" y="1697076"/>
+            <a:ext cx="1377237" cy="276999"/>
+          </a:xfrm>
+          <a:prstGeom prst="rect">
+            <a:avLst/>
+          </a:prstGeom>
+          <a:noFill/>
+        </p:spPr>
+        <p:txBody>
+          <a:bodyPr wrap="none" rtlCol="0">
+            <a:spAutoFit/>
+          </a:bodyPr>
+          <a:lstStyle/>
+          <a:p>
+            <a:r>
+              <a:rPr lang="en-US" sz="1200" dirty="0" err="1" smtClean="0"/>
+              <a:t>VCFsToIDCatalogs</a:t>
+            </a:r>
+            <a:r>
+              <a:rPr lang="en-US" sz="1200" dirty="0" smtClean="0"/>
+              <a:t>()</a:t>
+            </a:r>
+            <a:endParaRPr lang="en-US" sz="1200" dirty="0"/>
           </a:p>
         </p:txBody>
       </p:sp>
@@ -20677,26 +20627,17 @@
               <a:rPr lang="en-US" dirty="0" smtClean="0"/>
               <a:t>Steve Test of ID for Mutect</a:t>
             </a:r>
-            <a:endParaRPr lang="en-US" dirty="0" smtClean="0"/>
           </a:p>
           <a:p>
             <a:r>
               <a:rPr lang="en-US" dirty="0" smtClean="0"/>
-              <a:t>Steve or Nanhai Add </a:t>
-            </a:r>
+              <a:t>Steve or Nanhai Add documentation for user-visible global data</a:t>
+            </a:r>
+          </a:p>
+          <a:p>
             <a:r>
               <a:rPr lang="en-US" dirty="0" smtClean="0"/>
-              <a:t>documentation for user-visible global data</a:t>
-            </a:r>
-          </a:p>
-          <a:p>
-            <a:r>
-              <a:rPr lang="en-US" dirty="0" smtClean="0"/>
-              <a:t>Steve Get </a:t>
-            </a:r>
-            <a:r>
-              <a:rPr lang="en-US" dirty="0" smtClean="0"/>
-              <a:t>MSI </a:t>
+              <a:t>Steve Get MSI </a:t>
             </a:r>
             <a:r>
               <a:rPr lang="en-US" dirty="0" err="1" smtClean="0"/>
@@ -20704,11 +20645,7 @@
             </a:r>
             <a:r>
               <a:rPr lang="en-US" dirty="0" smtClean="0"/>
-              <a:t> for testing indel VCF processing (maybe from Mini’s paper</a:t>
-            </a:r>
-            <a:r>
-              <a:rPr lang="en-US" dirty="0" smtClean="0"/>
-              <a:t>?)</a:t>
+              <a:t> for testing indel VCF processing (maybe from Mini’s paper?)</a:t>
             </a:r>
           </a:p>
           <a:p>
@@ -20716,7 +20653,6 @@
               <a:rPr lang="en-US" dirty="0" smtClean="0"/>
               <a:t>Steve Strelka ID VCF to catalogs</a:t>
             </a:r>
-            <a:endParaRPr lang="en-US" dirty="0" smtClean="0"/>
           </a:p>
           <a:p>
             <a:r>
@@ -20745,7 +20681,6 @@
               <a:rPr lang="en-US" dirty="0" smtClean="0"/>
               <a:t>out</a:t>
             </a:r>
-            <a:endParaRPr lang="en-US" dirty="0" smtClean="0"/>
           </a:p>
           <a:p>
             <a:pPr marL="0" indent="0">

</xml_diff>

<commit_message>
Some function renameing and lots of documentaiton updates
</commit_message>
<xml_diff>
--- a/data-raw/ICAMS-overview.pptx
+++ b/data-raw/ICAMS-overview.pptx
@@ -3057,7 +3057,7 @@
         </p:nvSpPr>
         <p:spPr>
           <a:xfrm>
-            <a:off x="1669978" y="5385465"/>
+            <a:off x="4102372" y="5574651"/>
             <a:ext cx="919370" cy="459828"/>
           </a:xfrm>
           <a:custGeom>
@@ -3682,8 +3682,8 @@
         </p:nvCxnSpPr>
         <p:spPr>
           <a:xfrm>
-            <a:off x="6112516" y="3869308"/>
-            <a:ext cx="504497" cy="1689826"/>
+            <a:off x="6112516" y="3797237"/>
+            <a:ext cx="333328" cy="1797269"/>
           </a:xfrm>
           <a:prstGeom prst="straightConnector1">
             <a:avLst/>
@@ -3746,8 +3746,8 @@
         </p:nvCxnSpPr>
         <p:spPr>
           <a:xfrm flipH="1">
-            <a:off x="2177557" y="3815255"/>
-            <a:ext cx="3493525" cy="1533402"/>
+            <a:off x="4544973" y="3878317"/>
+            <a:ext cx="1189171" cy="1693667"/>
           </a:xfrm>
           <a:prstGeom prst="straightConnector1">
             <a:avLst/>
@@ -4137,8 +4137,8 @@
         </p:nvSpPr>
         <p:spPr>
           <a:xfrm>
-            <a:off x="1611080" y="2341470"/>
-            <a:ext cx="5741253" cy="3785222"/>
+            <a:off x="2747704" y="2341470"/>
+            <a:ext cx="4604629" cy="3785222"/>
           </a:xfrm>
           <a:prstGeom prst="rect">
             <a:avLst/>
@@ -4166,7 +4166,11 @@
           <a:lstStyle/>
           <a:p>
             <a:pPr algn="ctr"/>
-            <a:endParaRPr lang="en-US"/>
+            <a:endParaRPr lang="en-US" dirty="0">
+              <a:solidFill>
+                <a:schemeClr val="tx1"/>
+              </a:solidFill>
+            </a:endParaRPr>
           </a:p>
         </p:txBody>
       </p:sp>
@@ -4448,7 +4452,7 @@
         <p:spPr>
           <a:xfrm>
             <a:off x="3391950" y="1008291"/>
-            <a:ext cx="2010230" cy="369332"/>
+            <a:ext cx="2990499" cy="369332"/>
           </a:xfrm>
           <a:prstGeom prst="rect">
             <a:avLst/>
@@ -4462,8 +4466,12 @@
           <a:lstStyle/>
           <a:p>
             <a:r>
+              <a:rPr lang="en-US" dirty="0" smtClean="0"/>
+              <a:t>?</a:t>
+            </a:r>
+            <a:r>
               <a:rPr lang="en-US" dirty="0" err="1" smtClean="0"/>
-              <a:t>ReadStrelkaSNSVCF</a:t>
+              <a:t>ReadAndSplitStrelkaSNSVCFs</a:t>
             </a:r>
             <a:endParaRPr lang="en-US" dirty="0"/>
           </a:p>
@@ -4478,7 +4486,7 @@
         <p:spPr>
           <a:xfrm>
             <a:off x="8299175" y="1040293"/>
-            <a:ext cx="1848839" cy="369332"/>
+            <a:ext cx="2042034" cy="369332"/>
           </a:xfrm>
           <a:prstGeom prst="rect">
             <a:avLst/>
@@ -4492,8 +4500,12 @@
           <a:lstStyle/>
           <a:p>
             <a:r>
+              <a:rPr lang="en-US" dirty="0" smtClean="0"/>
+              <a:t>?</a:t>
+            </a:r>
+            <a:r>
               <a:rPr lang="en-US" dirty="0" err="1" smtClean="0"/>
-              <a:t>ReadStrelkaIDVCF</a:t>
+              <a:t>ReadStrelkaIDVCFs</a:t>
             </a:r>
             <a:endParaRPr lang="en-US" dirty="0"/>
           </a:p>
@@ -4555,6 +4567,99 @@
               <a:rPr lang="en-US" sz="1400" dirty="0"/>
               <a:t>MCF10A_Carb_Low_cl2_Strelka_SNS.vcf</a:t>
             </a:r>
+          </a:p>
+        </p:txBody>
+      </p:sp>
+      <p:cxnSp>
+        <p:nvCxnSpPr>
+          <p:cNvPr id="4" name="Straight Connector 3"/>
+          <p:cNvCxnSpPr/>
+          <p:nvPr/>
+        </p:nvCxnSpPr>
+        <p:spPr>
+          <a:xfrm>
+            <a:off x="2729687" y="3409861"/>
+            <a:ext cx="4621548" cy="0"/>
+          </a:xfrm>
+          <a:prstGeom prst="line">
+            <a:avLst/>
+          </a:prstGeom>
+          <a:ln w="12700">
+            <a:prstDash val="sysDash"/>
+          </a:ln>
+        </p:spPr>
+        <p:style>
+          <a:lnRef idx="1">
+            <a:schemeClr val="accent1"/>
+          </a:lnRef>
+          <a:fillRef idx="0">
+            <a:schemeClr val="accent1"/>
+          </a:fillRef>
+          <a:effectRef idx="0">
+            <a:schemeClr val="accent1"/>
+          </a:effectRef>
+          <a:fontRef idx="minor">
+            <a:schemeClr val="tx1"/>
+          </a:fontRef>
+        </p:style>
+      </p:cxnSp>
+      <p:sp>
+        <p:nvSpPr>
+          <p:cNvPr id="5" name="TextBox 4"/>
+          <p:cNvSpPr txBox="1"/>
+          <p:nvPr/>
+        </p:nvSpPr>
+        <p:spPr>
+          <a:xfrm>
+            <a:off x="2868570" y="2680138"/>
+            <a:ext cx="1815690" cy="307777"/>
+          </a:xfrm>
+          <a:prstGeom prst="rect">
+            <a:avLst/>
+          </a:prstGeom>
+          <a:noFill/>
+        </p:spPr>
+        <p:txBody>
+          <a:bodyPr wrap="none" rtlCol="0">
+            <a:spAutoFit/>
+          </a:bodyPr>
+          <a:lstStyle/>
+          <a:p>
+            <a:r>
+              <a:rPr lang="en-US" sz="1400" dirty="0" err="1"/>
+              <a:t>ReadListOfStrelkaVCFs</a:t>
+            </a:r>
+            <a:endParaRPr lang="en-US" sz="1400" dirty="0"/>
+          </a:p>
+        </p:txBody>
+      </p:sp>
+      <p:sp>
+        <p:nvSpPr>
+          <p:cNvPr id="29" name="TextBox 28"/>
+          <p:cNvSpPr txBox="1"/>
+          <p:nvPr/>
+        </p:nvSpPr>
+        <p:spPr>
+          <a:xfrm>
+            <a:off x="2868570" y="3611805"/>
+            <a:ext cx="1770741" cy="307777"/>
+          </a:xfrm>
+          <a:prstGeom prst="rect">
+            <a:avLst/>
+          </a:prstGeom>
+          <a:noFill/>
+        </p:spPr>
+        <p:txBody>
+          <a:bodyPr wrap="none" rtlCol="0">
+            <a:spAutoFit/>
+          </a:bodyPr>
+          <a:lstStyle/>
+          <a:p>
+            <a:r>
+              <a:rPr lang="en-US" sz="1400" dirty="0" err="1" smtClean="0"/>
+              <a:t>SplitListOfStrelkaVCFs</a:t>
+            </a:r>
+            <a:endParaRPr lang="en-US" sz="1400" dirty="0"/>
           </a:p>
         </p:txBody>
       </p:sp>
@@ -4738,8 +4843,8 @@
         </p:nvSpPr>
         <p:spPr>
           <a:xfrm>
-            <a:off x="2931219" y="4892622"/>
-            <a:ext cx="919370" cy="459828"/>
+            <a:off x="3477423" y="5352075"/>
+            <a:ext cx="1413690" cy="459828"/>
           </a:xfrm>
           <a:custGeom>
             <a:avLst/>
@@ -4910,8 +5015,8 @@
         </p:nvSpPr>
         <p:spPr>
           <a:xfrm>
-            <a:off x="4888341" y="5316040"/>
-            <a:ext cx="919370" cy="459828"/>
+            <a:off x="5355771" y="5334058"/>
+            <a:ext cx="2202668" cy="459828"/>
           </a:xfrm>
           <a:custGeom>
             <a:avLst/>
@@ -5016,7 +5121,7 @@
                   <a:schemeClr val="tx1"/>
                 </a:solidFill>
               </a:rPr>
-              <a:t>=Unannotated DNS </a:t>
+              <a:t>Unannotated DNS </a:t>
             </a:r>
             <a:r>
               <a:rPr lang="en-US" sz="1100" dirty="0" err="1" smtClean="0">
@@ -5026,24 +5131,14 @@
               </a:rPr>
               <a:t>VCFs</a:t>
             </a:r>
-            <a:endParaRPr lang="en-US" sz="1100" dirty="0" smtClean="0">
-              <a:solidFill>
-                <a:schemeClr val="tx1"/>
-              </a:solidFill>
-            </a:endParaRPr>
-          </a:p>
-          <a:p>
-            <a:pPr lvl="0" algn="ctr" defTabSz="533400">
-              <a:lnSpc>
-                <a:spcPct val="90000"/>
-              </a:lnSpc>
-              <a:spcBef>
-                <a:spcPct val="0"/>
-              </a:spcBef>
-              <a:spcAft>
-                <a:spcPts val="0"/>
-              </a:spcAft>
-            </a:pPr>
+            <a:r>
+              <a:rPr lang="en-US" sz="1100" dirty="0" smtClean="0">
+                <a:solidFill>
+                  <a:schemeClr val="tx1"/>
+                </a:solidFill>
+              </a:rPr>
+              <a:t> </a:t>
+            </a:r>
             <a:r>
               <a:rPr lang="en-US" sz="1100" kern="1200" dirty="0" smtClean="0">
                 <a:solidFill>
@@ -5068,8 +5163,8 @@
         </p:nvSpPr>
         <p:spPr>
           <a:xfrm>
-            <a:off x="3105732" y="2323318"/>
-            <a:ext cx="906789" cy="823399"/>
+            <a:off x="10042560" y="3918858"/>
+            <a:ext cx="906789" cy="826934"/>
           </a:xfrm>
           <a:custGeom>
             <a:avLst/>
@@ -5434,9 +5529,9 @@
           <p:nvPr/>
         </p:nvCxnSpPr>
         <p:spPr>
-          <a:xfrm flipH="1" flipV="1">
-            <a:off x="4062999" y="2904163"/>
-            <a:ext cx="891878" cy="193692"/>
+          <a:xfrm>
+            <a:off x="7720600" y="3238688"/>
+            <a:ext cx="2342304" cy="1986455"/>
           </a:xfrm>
           <a:prstGeom prst="straightConnector1">
             <a:avLst/>
@@ -5707,7 +5802,7 @@
         </p:nvSpPr>
         <p:spPr>
           <a:xfrm>
-            <a:off x="3055433" y="3227959"/>
+            <a:off x="10113880" y="4935140"/>
             <a:ext cx="906789" cy="823399"/>
           </a:xfrm>
           <a:custGeom>
@@ -5842,15 +5937,13 @@
       <p:cxnSp>
         <p:nvCxnSpPr>
           <p:cNvPr id="33" name="Straight Arrow Connector 32"/>
-          <p:cNvCxnSpPr>
-            <a:stCxn id="105" idx="3"/>
-          </p:cNvCxnSpPr>
+          <p:cNvCxnSpPr/>
           <p:nvPr/>
         </p:nvCxnSpPr>
         <p:spPr>
-          <a:xfrm flipH="1">
-            <a:off x="4017205" y="3222419"/>
-            <a:ext cx="993360" cy="379180"/>
+          <a:xfrm>
+            <a:off x="8046554" y="3213410"/>
+            <a:ext cx="1993828" cy="1119855"/>
           </a:xfrm>
           <a:prstGeom prst="straightConnector1">
             <a:avLst/>
@@ -5885,7 +5978,7 @@
         </p:nvSpPr>
         <p:spPr>
           <a:xfrm>
-            <a:off x="8390673" y="5226455"/>
+            <a:off x="8084371" y="5203933"/>
             <a:ext cx="1442548" cy="561247"/>
           </a:xfrm>
           <a:custGeom>
@@ -6050,8 +6143,8 @@
         </p:nvCxnSpPr>
         <p:spPr>
           <a:xfrm flipH="1">
-            <a:off x="3454901" y="3288236"/>
-            <a:ext cx="2265730" cy="1575355"/>
+            <a:off x="3797238" y="3270219"/>
+            <a:ext cx="1860330" cy="2048321"/>
           </a:xfrm>
           <a:prstGeom prst="straightConnector1">
             <a:avLst/>
@@ -6084,7 +6177,7 @@
         <p:spPr>
           <a:xfrm>
             <a:off x="4657398" y="964854"/>
-            <a:ext cx="1781513" cy="369332"/>
+            <a:ext cx="2675989" cy="369332"/>
           </a:xfrm>
           <a:prstGeom prst="rect">
             <a:avLst/>
@@ -6098,8 +6191,12 @@
           <a:lstStyle/>
           <a:p>
             <a:r>
+              <a:rPr lang="en-US" dirty="0" smtClean="0"/>
+              <a:t>?</a:t>
+            </a:r>
+            <a:r>
               <a:rPr lang="en-US" dirty="0" err="1" smtClean="0"/>
-              <a:t>ReadMutectVCFs</a:t>
+              <a:t>ReadAndSplitMutectVCFs</a:t>
             </a:r>
             <a:endParaRPr lang="en-US" dirty="0"/>
           </a:p>
@@ -6131,6 +6228,103 @@
               <a:rPr lang="en-US" sz="1400" dirty="0"/>
               <a:t>MCF10A_Carb_Low_cl2_Mutect.vcf</a:t>
             </a:r>
+          </a:p>
+        </p:txBody>
+      </p:sp>
+      <p:cxnSp>
+        <p:nvCxnSpPr>
+          <p:cNvPr id="8" name="Straight Connector 7"/>
+          <p:cNvCxnSpPr/>
+          <p:nvPr/>
+        </p:nvCxnSpPr>
+        <p:spPr>
+          <a:xfrm>
+            <a:off x="1527003" y="2846810"/>
+            <a:ext cx="9756603" cy="0"/>
+          </a:xfrm>
+          <a:prstGeom prst="line">
+            <a:avLst/>
+          </a:prstGeom>
+          <a:ln w="12700">
+            <a:prstDash val="sysDash"/>
+          </a:ln>
+        </p:spPr>
+        <p:style>
+          <a:lnRef idx="1">
+            <a:schemeClr val="accent1"/>
+          </a:lnRef>
+          <a:fillRef idx="0">
+            <a:schemeClr val="accent1"/>
+          </a:fillRef>
+          <a:effectRef idx="0">
+            <a:schemeClr val="accent1"/>
+          </a:effectRef>
+          <a:fontRef idx="minor">
+            <a:schemeClr val="tx1"/>
+          </a:fontRef>
+        </p:style>
+      </p:cxnSp>
+      <p:sp>
+        <p:nvSpPr>
+          <p:cNvPr id="9" name="TextBox 8"/>
+          <p:cNvSpPr txBox="1"/>
+          <p:nvPr/>
+        </p:nvSpPr>
+        <p:spPr>
+          <a:xfrm>
+            <a:off x="1918889" y="3004457"/>
+            <a:ext cx="1844800" cy="307777"/>
+          </a:xfrm>
+          <a:prstGeom prst="rect">
+            <a:avLst/>
+          </a:prstGeom>
+          <a:noFill/>
+        </p:spPr>
+        <p:txBody>
+          <a:bodyPr wrap="none" rtlCol="0">
+            <a:spAutoFit/>
+          </a:bodyPr>
+          <a:lstStyle/>
+          <a:p>
+            <a:r>
+              <a:rPr lang="en-US" sz="1400" dirty="0" err="1" smtClean="0"/>
+              <a:t>SplitListOfMutectVCFs</a:t>
+            </a:r>
+            <a:r>
+              <a:rPr lang="en-US" sz="1400" dirty="0" smtClean="0"/>
+              <a:t> </a:t>
+            </a:r>
+            <a:endParaRPr lang="en-US" sz="1400" dirty="0"/>
+          </a:p>
+        </p:txBody>
+      </p:sp>
+      <p:sp>
+        <p:nvSpPr>
+          <p:cNvPr id="10" name="TextBox 9"/>
+          <p:cNvSpPr txBox="1"/>
+          <p:nvPr/>
+        </p:nvSpPr>
+        <p:spPr>
+          <a:xfrm>
+            <a:off x="2288252" y="2063031"/>
+            <a:ext cx="1849674" cy="307777"/>
+          </a:xfrm>
+          <a:prstGeom prst="rect">
+            <a:avLst/>
+          </a:prstGeom>
+          <a:noFill/>
+        </p:spPr>
+        <p:txBody>
+          <a:bodyPr wrap="none" rtlCol="0">
+            <a:spAutoFit/>
+          </a:bodyPr>
+          <a:lstStyle/>
+          <a:p>
+            <a:r>
+              <a:rPr lang="en-US" sz="1400" dirty="0" err="1"/>
+              <a:t>ReadListOfMutectVCFs</a:t>
+            </a:r>
+            <a:endParaRPr lang="en-US" sz="1400" dirty="0"/>
           </a:p>
         </p:txBody>
       </p:sp>
@@ -13393,9 +13587,16 @@
             <p:ph type="title"/>
           </p:nvPr>
         </p:nvSpPr>
-        <p:spPr/>
+        <p:spPr>
+          <a:xfrm>
+            <a:off x="838200" y="365125"/>
+            <a:ext cx="10515600" cy="504231"/>
+          </a:xfrm>
+        </p:spPr>
         <p:txBody>
-          <a:bodyPr/>
+          <a:bodyPr>
+            <a:normAutofit fontScale="90000"/>
+          </a:bodyPr>
           <a:lstStyle/>
           <a:p>
             <a:r>
@@ -13418,44 +13619,17 @@
         </p:nvSpPr>
         <p:spPr>
           <a:xfrm>
-            <a:off x="847209" y="1857156"/>
-            <a:ext cx="10515600" cy="4351338"/>
+            <a:off x="847209" y="1139622"/>
+            <a:ext cx="10515600" cy="5068872"/>
           </a:xfrm>
         </p:spPr>
         <p:txBody>
           <a:bodyPr>
-            <a:normAutofit/>
+            <a:normAutofit fontScale="92500"/>
           </a:bodyPr>
           <a:lstStyle/>
           <a:p>
             <a:r>
-              <a:rPr lang="en-US" dirty="0"/>
-              <a:t>Move </a:t>
-            </a:r>
-            <a:r>
-              <a:rPr lang="en-US" dirty="0" err="1" smtClean="0"/>
-              <a:t>SplitOneMutectVCF</a:t>
-            </a:r>
-            <a:r>
-              <a:rPr lang="en-US" dirty="0"/>
-              <a:t>, </a:t>
-            </a:r>
-            <a:r>
-              <a:rPr lang="en-US" dirty="0" err="1" smtClean="0"/>
-              <a:t>SplitMutectVCFs</a:t>
-            </a:r>
-            <a:r>
-              <a:rPr lang="en-US" dirty="0" smtClean="0"/>
-              <a:t> to </a:t>
-            </a:r>
-            <a:r>
-              <a:rPr lang="en-US" dirty="0" err="1" smtClean="0"/>
-              <a:t>VCF_to_catalog_functions.R</a:t>
-            </a:r>
-            <a:endParaRPr lang="en-US" dirty="0"/>
-          </a:p>
-          <a:p>
-            <a:r>
               <a:rPr lang="en-US" dirty="0" err="1" smtClean="0"/>
               <a:t>Fn</a:t>
             </a:r>
@@ -13470,16 +13644,16 @@
           </a:p>
           <a:p>
             <a:r>
-              <a:rPr lang="en-US" dirty="0" smtClean="0"/>
-              <a:t>(</a:t>
-            </a:r>
-            <a:r>
               <a:rPr lang="en-US" dirty="0" err="1" smtClean="0"/>
               <a:t>Fn</a:t>
             </a:r>
             <a:r>
               <a:rPr lang="en-US" dirty="0" smtClean="0"/>
-              <a:t> for Opportunity </a:t>
+              <a:t> </a:t>
+            </a:r>
+            <a:r>
+              <a:rPr lang="en-US" dirty="0" smtClean="0"/>
+              <a:t>for Opportunity </a:t>
             </a:r>
             <a:r>
               <a:rPr lang="en-US" dirty="0"/>
@@ -13505,6 +13679,124 @@
               <a:rPr lang="en-US" dirty="0" smtClean="0"/>
               <a:t>Create documentation (man pages) for global data</a:t>
             </a:r>
+          </a:p>
+          <a:p>
+            <a:r>
+              <a:rPr lang="en-US" dirty="0" smtClean="0"/>
+              <a:t>Get all </a:t>
+            </a:r>
+            <a:r>
+              <a:rPr lang="en-US" dirty="0"/>
+              <a:t>the abundance files from </a:t>
+            </a:r>
+            <a:r>
+              <a:rPr lang="en-US" dirty="0" smtClean="0"/>
+              <a:t>….Dropbox </a:t>
+            </a:r>
+            <a:r>
+              <a:rPr lang="en-US" dirty="0"/>
+              <a:t>(CCB)\</a:t>
+            </a:r>
+            <a:r>
+              <a:rPr lang="en-US" dirty="0" err="1"/>
+              <a:t>ICAMS</a:t>
+            </a:r>
+            <a:r>
+              <a:rPr lang="en-US" dirty="0"/>
+              <a:t> R package </a:t>
+            </a:r>
+            <a:r>
+              <a:rPr lang="en-US" dirty="0" smtClean="0"/>
+              <a:t>development\</a:t>
+            </a:r>
+            <a:r>
+              <a:rPr lang="en-US" dirty="0" err="1" smtClean="0"/>
+              <a:t>nucleotide_abundance</a:t>
+            </a:r>
+            <a:r>
+              <a:rPr lang="en-US" dirty="0" smtClean="0"/>
+              <a:t> and put them in the package</a:t>
+            </a:r>
+          </a:p>
+          <a:p>
+            <a:r>
+              <a:rPr lang="en-US" dirty="0" smtClean="0"/>
+              <a:t>Expand package for </a:t>
+            </a:r>
+            <a:r>
+              <a:rPr lang="en-US" dirty="0" err="1" smtClean="0"/>
+              <a:t>GRCh38</a:t>
+            </a:r>
+            <a:r>
+              <a:rPr lang="en-US" dirty="0" smtClean="0"/>
+              <a:t>, </a:t>
+            </a:r>
+            <a:r>
+              <a:rPr lang="en-US" dirty="0" err="1" smtClean="0"/>
+              <a:t>MM10</a:t>
+            </a:r>
+            <a:endParaRPr lang="en-US" dirty="0" smtClean="0"/>
+          </a:p>
+          <a:p>
+            <a:r>
+              <a:rPr lang="en-US" dirty="0" smtClean="0"/>
+              <a:t>Write </a:t>
+            </a:r>
+            <a:r>
+              <a:rPr lang="en-US" dirty="0" err="1" smtClean="0"/>
+              <a:t>Test</a:t>
+            </a:r>
+            <a:r>
+              <a:rPr lang="en-US" dirty="0" err="1" smtClean="0">
+                <a:solidFill>
+                  <a:srgbClr val="FF0000"/>
+                </a:solidFill>
+              </a:rPr>
+              <a:t>Strelka</a:t>
+            </a:r>
+            <a:r>
+              <a:rPr lang="en-US" dirty="0" err="1" smtClean="0"/>
+              <a:t>VCFToCatalog</a:t>
+            </a:r>
+            <a:r>
+              <a:rPr lang="en-US" dirty="0" smtClean="0"/>
+              <a:t> (incl. plotting) and </a:t>
+            </a:r>
+            <a:r>
+              <a:rPr lang="en-US" dirty="0"/>
+              <a:t>check against </a:t>
+            </a:r>
+            <a:r>
+              <a:rPr lang="en-US" dirty="0" smtClean="0"/>
+              <a:t>Arnoud – this the carboplatin </a:t>
+            </a:r>
+            <a:r>
+              <a:rPr lang="en-US" dirty="0" err="1" smtClean="0"/>
+              <a:t>vcf</a:t>
+            </a:r>
+            <a:endParaRPr lang="en-US" dirty="0" smtClean="0"/>
+          </a:p>
+          <a:p>
+            <a:r>
+              <a:rPr lang="en-US" dirty="0" smtClean="0"/>
+              <a:t>Write and test </a:t>
+            </a:r>
+            <a:r>
+              <a:rPr lang="en-US" dirty="0" err="1" smtClean="0"/>
+              <a:t>ReadAndSplitStrelkaSNSVCFs</a:t>
+            </a:r>
+            <a:r>
+              <a:rPr lang="en-US" dirty="0" smtClean="0"/>
+              <a:t>, </a:t>
+            </a:r>
+            <a:r>
+              <a:rPr lang="en-US" dirty="0" err="1" smtClean="0"/>
+              <a:t>ReadAndSplitMutectVCFs</a:t>
+            </a:r>
+            <a:endParaRPr lang="en-US" dirty="0"/>
+          </a:p>
+          <a:p>
+            <a:endParaRPr lang="en-US" dirty="0" smtClean="0"/>
           </a:p>
           <a:p>
             <a:pPr marL="0" indent="0">
@@ -13563,7 +13855,12 @@
             <p:ph type="title"/>
           </p:nvPr>
         </p:nvSpPr>
-        <p:spPr/>
+        <p:spPr>
+          <a:xfrm>
+            <a:off x="815678" y="162425"/>
+            <a:ext cx="10515600" cy="738461"/>
+          </a:xfrm>
+        </p:spPr>
         <p:txBody>
           <a:bodyPr/>
           <a:lstStyle/>
@@ -13596,8 +13893,8 @@
         </p:nvSpPr>
         <p:spPr>
           <a:xfrm>
-            <a:off x="847209" y="1857156"/>
-            <a:ext cx="10515600" cy="4351338"/>
+            <a:off x="847209" y="860347"/>
+            <a:ext cx="10515600" cy="5348147"/>
           </a:xfrm>
         </p:spPr>
         <p:txBody>
@@ -13612,20 +13909,17 @@
             </a:pPr>
             <a:r>
               <a:rPr lang="en-US" dirty="0" smtClean="0"/>
-              <a:t>Test of ID VCF to catalogs for Strelka </a:t>
-            </a:r>
-            <a:r>
-              <a:rPr lang="en-US" smtClean="0"/>
-              <a:t>(create </a:t>
+              <a:t>Test of ID VCF to catalogs for Strelka (create </a:t>
             </a:r>
             <a:r>
               <a:rPr lang="en-US" dirty="0" err="1" smtClean="0"/>
-              <a:t>ReadStrelkaIDVCF</a:t>
+              <a:t>ReadStrelkaIDVCFs</a:t>
             </a:r>
             <a:r>
               <a:rPr lang="en-US" dirty="0" smtClean="0"/>
               <a:t>)</a:t>
             </a:r>
+            <a:endParaRPr lang="en-US" dirty="0" smtClean="0"/>
           </a:p>
           <a:p>
             <a:pPr marL="514350" indent="-514350">
@@ -13648,8 +13942,9 @@
             </a:r>
           </a:p>
           <a:p>
-            <a:pPr marL="0" indent="0">
-              <a:buNone/>
+            <a:pPr marL="514350" indent="-514350">
+              <a:buFont typeface="+mj-lt"/>
+              <a:buAutoNum type="arabicPeriod"/>
             </a:pPr>
             <a:r>
               <a:rPr lang="en-US" dirty="0" smtClean="0"/>
@@ -13665,31 +13960,30 @@
             </a:r>
           </a:p>
           <a:p>
-            <a:pPr marL="0" indent="0">
-              <a:buNone/>
+            <a:pPr marL="514350" indent="-514350">
+              <a:buFont typeface="+mj-lt"/>
+              <a:buAutoNum type="arabicPeriod"/>
             </a:pPr>
             <a:r>
               <a:rPr lang="en-US" dirty="0" smtClean="0"/>
-              <a:t>5. Compare ID catalogs to previously computed ID catalogs (maybe from PCAWG?)</a:t>
-            </a:r>
-          </a:p>
-          <a:p>
-            <a:pPr marL="0" indent="0">
-              <a:buNone/>
+              <a:t>Compare ID catalogs to previously computed ID catalogs (maybe from PCAWG?)</a:t>
+            </a:r>
+          </a:p>
+          <a:p>
+            <a:pPr marL="514350" indent="-514350">
+              <a:buFont typeface="+mj-lt"/>
+              <a:buAutoNum type="arabicPeriod"/>
             </a:pPr>
             <a:r>
               <a:rPr lang="en-US" dirty="0" smtClean="0"/>
-              <a:t>6. Extended sequence context for indels – spec and write</a:t>
-            </a:r>
-          </a:p>
-          <a:p>
-            <a:pPr marL="0" indent="0">
-              <a:buNone/>
+              <a:t>Extended sequence context for indels – spec and write</a:t>
+            </a:r>
+          </a:p>
+          <a:p>
+            <a:pPr marL="514350" indent="-514350">
+              <a:buFont typeface="+mj-lt"/>
+              <a:buAutoNum type="arabicPeriod"/>
             </a:pPr>
-            <a:r>
-              <a:rPr lang="en-US" dirty="0" smtClean="0"/>
-              <a:t>7. </a:t>
-            </a:r>
             <a:r>
               <a:rPr lang="en-US" dirty="0" err="1" smtClean="0"/>
               <a:t>Writeup</a:t>
@@ -13697,6 +13991,24 @@
             <a:r>
               <a:rPr lang="en-US" dirty="0" smtClean="0"/>
               <a:t> on “opportunity”</a:t>
+            </a:r>
+          </a:p>
+          <a:p>
+            <a:pPr marL="514350" indent="-514350">
+              <a:buFont typeface="+mj-lt"/>
+              <a:buAutoNum type="arabicPeriod"/>
+            </a:pPr>
+            <a:r>
+              <a:rPr lang="en-US" dirty="0"/>
+              <a:t>Add plotting to </a:t>
+            </a:r>
+            <a:r>
+              <a:rPr lang="en-US" dirty="0" err="1" smtClean="0"/>
+              <a:t>TestMutectVCFToCatalog</a:t>
+            </a:r>
+            <a:r>
+              <a:rPr lang="en-US" dirty="0" smtClean="0"/>
+              <a:t> and check against Arnoud</a:t>
             </a:r>
           </a:p>
           <a:p>

</xml_diff>

<commit_message>
moved opportunity documentation from steve's to-do to nanhai's to-do
</commit_message>
<xml_diff>
--- a/data-raw/ICAMS-overview.pptx
+++ b/data-raw/ICAMS-overview.pptx
@@ -248,7 +248,7 @@
           <a:p>
             <a:fld id="{FC92A4BB-39BE-403C-A496-EAAF42256EA7}" type="datetimeFigureOut">
               <a:rPr lang="en-SG" smtClean="0"/>
-              <a:t>30/1/2019</a:t>
+              <a:t>7/2/2019</a:t>
             </a:fld>
             <a:endParaRPr lang="en-SG"/>
           </a:p>
@@ -413,7 +413,7 @@
           <a:p>
             <a:fld id="{FC92A4BB-39BE-403C-A496-EAAF42256EA7}" type="datetimeFigureOut">
               <a:rPr lang="en-SG" smtClean="0"/>
-              <a:t>30/1/2019</a:t>
+              <a:t>7/2/2019</a:t>
             </a:fld>
             <a:endParaRPr lang="en-SG"/>
           </a:p>
@@ -588,7 +588,7 @@
           <a:p>
             <a:fld id="{FC92A4BB-39BE-403C-A496-EAAF42256EA7}" type="datetimeFigureOut">
               <a:rPr lang="en-SG" smtClean="0"/>
-              <a:t>30/1/2019</a:t>
+              <a:t>7/2/2019</a:t>
             </a:fld>
             <a:endParaRPr lang="en-SG"/>
           </a:p>
@@ -753,7 +753,7 @@
           <a:p>
             <a:fld id="{FC92A4BB-39BE-403C-A496-EAAF42256EA7}" type="datetimeFigureOut">
               <a:rPr lang="en-SG" smtClean="0"/>
-              <a:t>30/1/2019</a:t>
+              <a:t>7/2/2019</a:t>
             </a:fld>
             <a:endParaRPr lang="en-SG"/>
           </a:p>
@@ -994,7 +994,7 @@
           <a:p>
             <a:fld id="{FC92A4BB-39BE-403C-A496-EAAF42256EA7}" type="datetimeFigureOut">
               <a:rPr lang="en-SG" smtClean="0"/>
-              <a:t>30/1/2019</a:t>
+              <a:t>7/2/2019</a:t>
             </a:fld>
             <a:endParaRPr lang="en-SG"/>
           </a:p>
@@ -1221,7 +1221,7 @@
           <a:p>
             <a:fld id="{FC92A4BB-39BE-403C-A496-EAAF42256EA7}" type="datetimeFigureOut">
               <a:rPr lang="en-SG" smtClean="0"/>
-              <a:t>30/1/2019</a:t>
+              <a:t>7/2/2019</a:t>
             </a:fld>
             <a:endParaRPr lang="en-SG"/>
           </a:p>
@@ -1583,7 +1583,7 @@
           <a:p>
             <a:fld id="{FC92A4BB-39BE-403C-A496-EAAF42256EA7}" type="datetimeFigureOut">
               <a:rPr lang="en-SG" smtClean="0"/>
-              <a:t>30/1/2019</a:t>
+              <a:t>7/2/2019</a:t>
             </a:fld>
             <a:endParaRPr lang="en-SG"/>
           </a:p>
@@ -1696,7 +1696,7 @@
           <a:p>
             <a:fld id="{FC92A4BB-39BE-403C-A496-EAAF42256EA7}" type="datetimeFigureOut">
               <a:rPr lang="en-SG" smtClean="0"/>
-              <a:t>30/1/2019</a:t>
+              <a:t>7/2/2019</a:t>
             </a:fld>
             <a:endParaRPr lang="en-SG"/>
           </a:p>
@@ -1786,7 +1786,7 @@
           <a:p>
             <a:fld id="{FC92A4BB-39BE-403C-A496-EAAF42256EA7}" type="datetimeFigureOut">
               <a:rPr lang="en-SG" smtClean="0"/>
-              <a:t>30/1/2019</a:t>
+              <a:t>7/2/2019</a:t>
             </a:fld>
             <a:endParaRPr lang="en-SG"/>
           </a:p>
@@ -2058,7 +2058,7 @@
           <a:p>
             <a:fld id="{FC92A4BB-39BE-403C-A496-EAAF42256EA7}" type="datetimeFigureOut">
               <a:rPr lang="en-SG" smtClean="0"/>
-              <a:t>30/1/2019</a:t>
+              <a:t>7/2/2019</a:t>
             </a:fld>
             <a:endParaRPr lang="en-SG"/>
           </a:p>
@@ -2306,7 +2306,7 @@
           <a:p>
             <a:fld id="{FC92A4BB-39BE-403C-A496-EAAF42256EA7}" type="datetimeFigureOut">
               <a:rPr lang="en-SG" smtClean="0"/>
-              <a:t>30/1/2019</a:t>
+              <a:t>7/2/2019</a:t>
             </a:fld>
             <a:endParaRPr lang="en-SG"/>
           </a:p>
@@ -2514,7 +2514,7 @@
           <a:p>
             <a:fld id="{FC92A4BB-39BE-403C-A496-EAAF42256EA7}" type="datetimeFigureOut">
               <a:rPr lang="en-SG" smtClean="0"/>
-              <a:t>30/1/2019</a:t>
+              <a:t>7/2/2019</a:t>
             </a:fld>
             <a:endParaRPr lang="en-SG"/>
           </a:p>
@@ -12436,6 +12436,43 @@
               </a:rPr>
               <a:t>()</a:t>
             </a:r>
+          </a:p>
+          <a:p>
+            <a:pPr lvl="0" algn="ctr" defTabSz="533400">
+              <a:lnSpc>
+                <a:spcPct val="90000"/>
+              </a:lnSpc>
+              <a:spcBef>
+                <a:spcPct val="0"/>
+              </a:spcBef>
+              <a:spcAft>
+                <a:spcPts val="0"/>
+              </a:spcAft>
+            </a:pPr>
+            <a:r>
+              <a:rPr lang="en-US" sz="1100" kern="1200" dirty="0" smtClean="0">
+                <a:solidFill>
+                  <a:schemeClr val="tx1"/>
+                </a:solidFill>
+              </a:rPr>
+              <a:t>(no </a:t>
+            </a:r>
+            <a:r>
+              <a:rPr lang="en-US" sz="1100" kern="1200" dirty="0" err="1" smtClean="0">
+                <a:solidFill>
+                  <a:schemeClr val="tx1"/>
+                </a:solidFill>
+              </a:rPr>
+              <a:t>AddTranscript</a:t>
+            </a:r>
+            <a:r>
+              <a:rPr lang="en-US" sz="1100" kern="1200" dirty="0" smtClean="0">
+                <a:solidFill>
+                  <a:schemeClr val="tx1"/>
+                </a:solidFill>
+              </a:rPr>
+              <a:t>)</a:t>
+            </a:r>
             <a:endParaRPr lang="en-US" sz="1100" kern="1200" dirty="0">
               <a:solidFill>
                 <a:schemeClr val="tx1"/>
@@ -13625,7 +13662,7 @@
         </p:spPr>
         <p:txBody>
           <a:bodyPr>
-            <a:normAutofit fontScale="92500"/>
+            <a:normAutofit fontScale="92500" lnSpcReduction="20000"/>
           </a:bodyPr>
           <a:lstStyle/>
           <a:p>
@@ -13635,11 +13672,7 @@
             </a:r>
             <a:r>
               <a:rPr lang="en-US" dirty="0" smtClean="0"/>
-              <a:t> </a:t>
-            </a:r>
-            <a:r>
-              <a:rPr lang="en-US" dirty="0" smtClean="0"/>
-              <a:t>to write  _our_ annotated VCF to disk and read back</a:t>
+              <a:t> to write  _our_ annotated VCF to disk and read back</a:t>
             </a:r>
           </a:p>
           <a:p>
@@ -13649,11 +13682,7 @@
             </a:r>
             <a:r>
               <a:rPr lang="en-US" dirty="0" smtClean="0"/>
-              <a:t> </a:t>
-            </a:r>
-            <a:r>
-              <a:rPr lang="en-US" dirty="0" smtClean="0"/>
-              <a:t>for Opportunity </a:t>
+              <a:t> for Opportunity </a:t>
             </a:r>
             <a:r>
               <a:rPr lang="en-US" dirty="0"/>
@@ -13792,6 +13821,17 @@
             <a:r>
               <a:rPr lang="en-US" dirty="0" err="1" smtClean="0"/>
               <a:t>ReadAndSplitMutectVCFs</a:t>
+            </a:r>
+            <a:endParaRPr lang="en-US" dirty="0" smtClean="0"/>
+          </a:p>
+          <a:p>
+            <a:r>
+              <a:rPr lang="en-US" dirty="0" smtClean="0"/>
+              <a:t>Look in data-raw/background-documentation/opportunity and figure out which doc works best and clean it up for use in the </a:t>
+            </a:r>
+            <a:r>
+              <a:rPr lang="en-US" smtClean="0"/>
+              <a:t>package documentation.</a:t>
             </a:r>
             <a:endParaRPr lang="en-US" dirty="0"/>
           </a:p>
@@ -13919,7 +13959,6 @@
               <a:rPr lang="en-US" dirty="0" smtClean="0"/>
               <a:t>)</a:t>
             </a:r>
-            <a:endParaRPr lang="en-US" dirty="0" smtClean="0"/>
           </a:p>
           <a:p>
             <a:pPr marL="514350" indent="-514350">
@@ -13985,22 +14024,12 @@
               <a:buAutoNum type="arabicPeriod"/>
             </a:pPr>
             <a:r>
-              <a:rPr lang="en-US" dirty="0" err="1" smtClean="0"/>
-              <a:t>Writeup</a:t>
-            </a:r>
-            <a:r>
               <a:rPr lang="en-US" dirty="0" smtClean="0"/>
-              <a:t> on “opportunity”</a:t>
-            </a:r>
-          </a:p>
-          <a:p>
-            <a:pPr marL="514350" indent="-514350">
-              <a:buFont typeface="+mj-lt"/>
-              <a:buAutoNum type="arabicPeriod"/>
-            </a:pPr>
+              <a:t>Add </a:t>
+            </a:r>
             <a:r>
               <a:rPr lang="en-US" dirty="0"/>
-              <a:t>Add plotting to </a:t>
+              <a:t>plotting to </a:t>
             </a:r>
             <a:r>
               <a:rPr lang="en-US" dirty="0" err="1" smtClean="0"/>

</xml_diff>

<commit_message>
minor update to powerpoint documentation
</commit_message>
<xml_diff>
--- a/data-raw/ICAMS-overview.pptx
+++ b/data-raw/ICAMS-overview.pptx
@@ -249,7 +249,7 @@
           <a:p>
             <a:fld id="{FC92A4BB-39BE-403C-A496-EAAF42256EA7}" type="datetimeFigureOut">
               <a:rPr lang="en-SG" smtClean="0"/>
-              <a:t>26/2/2019</a:t>
+              <a:t>5/3/2019</a:t>
             </a:fld>
             <a:endParaRPr lang="en-SG"/>
           </a:p>
@@ -414,7 +414,7 @@
           <a:p>
             <a:fld id="{FC92A4BB-39BE-403C-A496-EAAF42256EA7}" type="datetimeFigureOut">
               <a:rPr lang="en-SG" smtClean="0"/>
-              <a:t>26/2/2019</a:t>
+              <a:t>5/3/2019</a:t>
             </a:fld>
             <a:endParaRPr lang="en-SG"/>
           </a:p>
@@ -589,7 +589,7 @@
           <a:p>
             <a:fld id="{FC92A4BB-39BE-403C-A496-EAAF42256EA7}" type="datetimeFigureOut">
               <a:rPr lang="en-SG" smtClean="0"/>
-              <a:t>26/2/2019</a:t>
+              <a:t>5/3/2019</a:t>
             </a:fld>
             <a:endParaRPr lang="en-SG"/>
           </a:p>
@@ -754,7 +754,7 @@
           <a:p>
             <a:fld id="{FC92A4BB-39BE-403C-A496-EAAF42256EA7}" type="datetimeFigureOut">
               <a:rPr lang="en-SG" smtClean="0"/>
-              <a:t>26/2/2019</a:t>
+              <a:t>5/3/2019</a:t>
             </a:fld>
             <a:endParaRPr lang="en-SG"/>
           </a:p>
@@ -995,7 +995,7 @@
           <a:p>
             <a:fld id="{FC92A4BB-39BE-403C-A496-EAAF42256EA7}" type="datetimeFigureOut">
               <a:rPr lang="en-SG" smtClean="0"/>
-              <a:t>26/2/2019</a:t>
+              <a:t>5/3/2019</a:t>
             </a:fld>
             <a:endParaRPr lang="en-SG"/>
           </a:p>
@@ -1222,7 +1222,7 @@
           <a:p>
             <a:fld id="{FC92A4BB-39BE-403C-A496-EAAF42256EA7}" type="datetimeFigureOut">
               <a:rPr lang="en-SG" smtClean="0"/>
-              <a:t>26/2/2019</a:t>
+              <a:t>5/3/2019</a:t>
             </a:fld>
             <a:endParaRPr lang="en-SG"/>
           </a:p>
@@ -1584,7 +1584,7 @@
           <a:p>
             <a:fld id="{FC92A4BB-39BE-403C-A496-EAAF42256EA7}" type="datetimeFigureOut">
               <a:rPr lang="en-SG" smtClean="0"/>
-              <a:t>26/2/2019</a:t>
+              <a:t>5/3/2019</a:t>
             </a:fld>
             <a:endParaRPr lang="en-SG"/>
           </a:p>
@@ -1697,7 +1697,7 @@
           <a:p>
             <a:fld id="{FC92A4BB-39BE-403C-A496-EAAF42256EA7}" type="datetimeFigureOut">
               <a:rPr lang="en-SG" smtClean="0"/>
-              <a:t>26/2/2019</a:t>
+              <a:t>5/3/2019</a:t>
             </a:fld>
             <a:endParaRPr lang="en-SG"/>
           </a:p>
@@ -1787,7 +1787,7 @@
           <a:p>
             <a:fld id="{FC92A4BB-39BE-403C-A496-EAAF42256EA7}" type="datetimeFigureOut">
               <a:rPr lang="en-SG" smtClean="0"/>
-              <a:t>26/2/2019</a:t>
+              <a:t>5/3/2019</a:t>
             </a:fld>
             <a:endParaRPr lang="en-SG"/>
           </a:p>
@@ -2059,7 +2059,7 @@
           <a:p>
             <a:fld id="{FC92A4BB-39BE-403C-A496-EAAF42256EA7}" type="datetimeFigureOut">
               <a:rPr lang="en-SG" smtClean="0"/>
-              <a:t>26/2/2019</a:t>
+              <a:t>5/3/2019</a:t>
             </a:fld>
             <a:endParaRPr lang="en-SG"/>
           </a:p>
@@ -2307,7 +2307,7 @@
           <a:p>
             <a:fld id="{FC92A4BB-39BE-403C-A496-EAAF42256EA7}" type="datetimeFigureOut">
               <a:rPr lang="en-SG" smtClean="0"/>
-              <a:t>26/2/2019</a:t>
+              <a:t>5/3/2019</a:t>
             </a:fld>
             <a:endParaRPr lang="en-SG"/>
           </a:p>
@@ -2515,7 +2515,7 @@
           <a:p>
             <a:fld id="{FC92A4BB-39BE-403C-A496-EAAF42256EA7}" type="datetimeFigureOut">
               <a:rPr lang="en-SG" smtClean="0"/>
-              <a:t>26/2/2019</a:t>
+              <a:t>5/3/2019</a:t>
             </a:fld>
             <a:endParaRPr lang="en-SG"/>
           </a:p>
@@ -6164,7 +6164,7 @@
         <p:spPr>
           <a:xfrm>
             <a:off x="4657398" y="964854"/>
-            <a:ext cx="4320413" cy="369332"/>
+            <a:ext cx="2639120" cy="369332"/>
           </a:xfrm>
           <a:prstGeom prst="rect">
             <a:avLst/>
@@ -6184,14 +6184,6 @@
                 </a:solidFill>
               </a:rPr>
               <a:t>ReadAndSplitMutectVCFs</a:t>
-            </a:r>
-            <a:r>
-              <a:rPr lang="en-US" dirty="0" smtClean="0">
-                <a:solidFill>
-                  <a:srgbClr val="FF0000"/>
-                </a:solidFill>
-              </a:rPr>
-              <a:t> (Nanhai to create)</a:t>
             </a:r>
             <a:endParaRPr lang="en-US" dirty="0">
               <a:solidFill>

</xml_diff>